<commit_message>
Added PyCharm to list of rec software
</commit_message>
<xml_diff>
--- a/Installation and Git Workshop.pptx
+++ b/Installation and Git Workshop.pptx
@@ -1577,7 +1577,7 @@
         </p:nvSpPr>
         <p:spPr>
           <a:xfrm>
-            <a:off x="381300" y="685800"/>
+            <a:off x="381000" y="685800"/>
             <a:ext cx="6096000" cy="3429000"/>
           </a:xfrm>
           <a:custGeom>
@@ -8563,10 +8563,9 @@
               <a:buChar char="●"/>
             </a:pPr>
             <a:r>
-              <a:rPr lang="en"/>
+              <a:rPr lang="en-US" dirty="0"/>
               <a:t>Packages:</a:t>
             </a:r>
-            <a:endParaRPr/>
           </a:p>
           <a:p>
             <a:pPr marL="914400" lvl="1" indent="-317500" algn="l" rtl="0">
@@ -8580,10 +8579,9 @@
               <a:buChar char="○"/>
             </a:pPr>
             <a:r>
-              <a:rPr lang="en"/>
+              <a:rPr lang="en-US" dirty="0"/>
               <a:t>Anaconda (+Python)</a:t>
             </a:r>
-            <a:endParaRPr/>
           </a:p>
           <a:p>
             <a:pPr marL="1371600" lvl="2" indent="-317500" algn="l" rtl="0">
@@ -8597,7 +8595,7 @@
               <a:buChar char="■"/>
             </a:pPr>
             <a:r>
-              <a:rPr lang="en" sz="1100" u="sng">
+              <a:rPr lang="en-US" sz="1100" u="sng" dirty="0">
                 <a:solidFill>
                   <a:schemeClr val="hlink"/>
                 </a:solidFill>
@@ -8605,7 +8603,7 @@
               </a:rPr>
               <a:t>https://www.anaconda.com/distribution/#download-section</a:t>
             </a:r>
-            <a:endParaRPr/>
+            <a:endParaRPr lang="en-US" dirty="0"/>
           </a:p>
           <a:p>
             <a:pPr marL="1371600" lvl="2" indent="-317500" algn="l" rtl="0">
@@ -8619,7 +8617,7 @@
               <a:buChar char="■"/>
             </a:pPr>
             <a:r>
-              <a:rPr lang="en" sz="1100" u="sng">
+              <a:rPr lang="en-US" sz="1100" u="sng" dirty="0">
                 <a:solidFill>
                   <a:schemeClr val="hlink"/>
                 </a:solidFill>
@@ -8627,7 +8625,7 @@
               </a:rPr>
               <a:t>https://docs.conda.io/projects/conda/en/4.6.0/_downloads/52a95608c49671267e40c689e0bc00ca/conda-cheatsheet.pdf</a:t>
             </a:r>
-            <a:endParaRPr/>
+            <a:endParaRPr lang="en-US" dirty="0"/>
           </a:p>
           <a:p>
             <a:pPr marL="914400" lvl="1" indent="-317500" algn="l" rtl="0">
@@ -8641,10 +8639,9 @@
               <a:buChar char="○"/>
             </a:pPr>
             <a:r>
-              <a:rPr lang="en"/>
+              <a:rPr lang="en-US" dirty="0"/>
               <a:t>Notepad++</a:t>
             </a:r>
-            <a:endParaRPr/>
           </a:p>
           <a:p>
             <a:pPr marL="1371600" lvl="2" indent="-317500" algn="l" rtl="0">
@@ -8658,7 +8655,7 @@
               <a:buChar char="■"/>
             </a:pPr>
             <a:r>
-              <a:rPr lang="en" sz="1100" u="sng">
+              <a:rPr lang="en-US" sz="1100" u="sng" dirty="0">
                 <a:solidFill>
                   <a:schemeClr val="hlink"/>
                 </a:solidFill>
@@ -8666,7 +8663,7 @@
               </a:rPr>
               <a:t>https://notepad-plus-plus.org/</a:t>
             </a:r>
-            <a:endParaRPr/>
+            <a:endParaRPr lang="en-US" dirty="0"/>
           </a:p>
           <a:p>
             <a:pPr marL="914400" lvl="1" indent="-317500" algn="l" rtl="0">
@@ -8680,10 +8677,9 @@
               <a:buChar char="○"/>
             </a:pPr>
             <a:r>
-              <a:rPr lang="en"/>
-              <a:t>Torch</a:t>
+              <a:rPr lang="en-US" dirty="0"/>
+              <a:t>PyCharm</a:t>
             </a:r>
-            <a:endParaRPr/>
           </a:p>
           <a:p>
             <a:pPr marL="1371600" lvl="2" indent="-317500" algn="l" rtl="0">
@@ -8697,7 +8693,45 @@
               <a:buChar char="■"/>
             </a:pPr>
             <a:r>
-              <a:rPr lang="en" sz="1100" u="sng">
+              <a:rPr lang="en-US" sz="1100" u="sng" dirty="0">
+                <a:solidFill>
+                  <a:schemeClr val="hlink"/>
+                </a:solidFill>
+              </a:rPr>
+              <a:t>https://www.jetbrains.com/pycharm/download/#section=windows</a:t>
+            </a:r>
+            <a:endParaRPr lang="en-US" dirty="0"/>
+          </a:p>
+          <a:p>
+            <a:pPr marL="914400" lvl="1" indent="-317500" algn="l" rtl="0">
+              <a:spcBef>
+                <a:spcPts val="0"/>
+              </a:spcBef>
+              <a:spcAft>
+                <a:spcPts val="0"/>
+              </a:spcAft>
+              <a:buSzPts val="1400"/>
+              <a:buChar char="○"/>
+            </a:pPr>
+            <a:r>
+              <a:rPr lang="en" dirty="0"/>
+              <a:t>Torch</a:t>
+            </a:r>
+            <a:endParaRPr lang="en-US" dirty="0"/>
+          </a:p>
+          <a:p>
+            <a:pPr marL="1371600" lvl="2" indent="-317500" algn="l" rtl="0">
+              <a:spcBef>
+                <a:spcPts val="0"/>
+              </a:spcBef>
+              <a:spcAft>
+                <a:spcPts val="0"/>
+              </a:spcAft>
+              <a:buSzPts val="1400"/>
+              <a:buChar char="■"/>
+            </a:pPr>
+            <a:r>
+              <a:rPr lang="en-US" sz="1100" u="sng" dirty="0">
                 <a:solidFill>
                   <a:schemeClr val="hlink"/>
                 </a:solidFill>
@@ -8705,7 +8739,7 @@
               </a:rPr>
               <a:t>https://pytorch.org/get-started/locally/</a:t>
             </a:r>
-            <a:endParaRPr/>
+            <a:endParaRPr lang="en-US" dirty="0"/>
           </a:p>
           <a:p>
             <a:pPr marL="914400" lvl="1" indent="-317500" algn="l" rtl="0">
@@ -8719,10 +8753,9 @@
               <a:buChar char="○"/>
             </a:pPr>
             <a:r>
-              <a:rPr lang="en"/>
+              <a:rPr lang="en-US" dirty="0"/>
               <a:t>Scikit Learn</a:t>
             </a:r>
-            <a:endParaRPr/>
           </a:p>
           <a:p>
             <a:pPr marL="1371600" lvl="2" indent="-317500" algn="l" rtl="0">
@@ -8736,7 +8769,7 @@
               <a:buChar char="■"/>
             </a:pPr>
             <a:r>
-              <a:rPr lang="en" sz="1000">
+              <a:rPr lang="en-US" sz="1000" dirty="0" err="1">
                 <a:solidFill>
                   <a:srgbClr val="FFFFFF"/>
                 </a:solidFill>
@@ -8745,9 +8778,21 @@
                 <a:cs typeface="Consolas"/>
                 <a:sym typeface="Consolas"/>
               </a:rPr>
-              <a:t>conda install scikit-learn</a:t>
+              <a:t>conda</a:t>
             </a:r>
-            <a:endParaRPr>
+            <a:r>
+              <a:rPr lang="en-US" sz="1000" dirty="0">
+                <a:solidFill>
+                  <a:srgbClr val="FFFFFF"/>
+                </a:solidFill>
+                <a:latin typeface="Consolas"/>
+                <a:ea typeface="Consolas"/>
+                <a:cs typeface="Consolas"/>
+                <a:sym typeface="Consolas"/>
+              </a:rPr>
+              <a:t> install scikit-learn</a:t>
+            </a:r>
+            <a:endParaRPr lang="en-US" dirty="0">
               <a:solidFill>
                 <a:srgbClr val="FFFFFF"/>
               </a:solidFill>
@@ -8765,10 +8810,9 @@
               <a:buChar char="○"/>
             </a:pPr>
             <a:r>
-              <a:rPr lang="en"/>
+              <a:rPr lang="en-US" dirty="0"/>
               <a:t>Git</a:t>
             </a:r>
-            <a:endParaRPr/>
           </a:p>
           <a:p>
             <a:pPr marL="1371600" lvl="2" indent="-317500" algn="l" rtl="0">
@@ -8782,7 +8826,7 @@
               <a:buChar char="■"/>
             </a:pPr>
             <a:r>
-              <a:rPr lang="en" sz="1100" u="sng">
+              <a:rPr lang="en-US" sz="1100" u="sng" dirty="0">
                 <a:solidFill>
                   <a:schemeClr val="hlink"/>
                 </a:solidFill>
@@ -8790,7 +8834,7 @@
               </a:rPr>
               <a:t>https://git-scm.com/book/en/v2/Getting-Started-Installing-Git</a:t>
             </a:r>
-            <a:endParaRPr/>
+            <a:endParaRPr lang="en-US" dirty="0"/>
           </a:p>
         </p:txBody>
       </p:sp>

</xml_diff>